<commit_message>
Arch: Move JFX into J9
</commit_message>
<xml_diff>
--- a/source/Diagrams.pptx
+++ b/source/Diagrams.pptx
@@ -105,6 +105,11 @@
       </a:defRPr>
     </a:lvl9pPr>
   </p:defaultTextStyle>
+  <p:extLst>
+    <p:ext uri="{EFAFB233-063F-42B5-8137-9DF3F51BA10A}">
+      <p15:sldGuideLst xmlns:p15="http://schemas.microsoft.com/office/powerpoint/2012/main"/>
+    </p:ext>
+  </p:extLst>
 </p:presentation>
 </file>
 
@@ -239,7 +244,7 @@
           <a:p>
             <a:fld id="{1214027B-283B-7949-830C-AE8AF1230416}" type="datetimeFigureOut">
               <a:rPr lang="en-US" smtClean="0"/>
-              <a:t>9/22/17</a:t>
+              <a:t>9/25/17</a:t>
             </a:fld>
             <a:endParaRPr lang="en-US" dirty="0"/>
           </a:p>
@@ -409,7 +414,7 @@
           <a:p>
             <a:fld id="{1214027B-283B-7949-830C-AE8AF1230416}" type="datetimeFigureOut">
               <a:rPr lang="en-US" smtClean="0"/>
-              <a:t>9/22/17</a:t>
+              <a:t>9/25/17</a:t>
             </a:fld>
             <a:endParaRPr lang="en-US" dirty="0"/>
           </a:p>
@@ -589,7 +594,7 @@
           <a:p>
             <a:fld id="{1214027B-283B-7949-830C-AE8AF1230416}" type="datetimeFigureOut">
               <a:rPr lang="en-US" smtClean="0"/>
-              <a:t>9/22/17</a:t>
+              <a:t>9/25/17</a:t>
             </a:fld>
             <a:endParaRPr lang="en-US" dirty="0"/>
           </a:p>
@@ -759,7 +764,7 @@
           <a:p>
             <a:fld id="{1214027B-283B-7949-830C-AE8AF1230416}" type="datetimeFigureOut">
               <a:rPr lang="en-US" smtClean="0"/>
-              <a:t>9/22/17</a:t>
+              <a:t>9/25/17</a:t>
             </a:fld>
             <a:endParaRPr lang="en-US" dirty="0"/>
           </a:p>
@@ -1005,7 +1010,7 @@
           <a:p>
             <a:fld id="{1214027B-283B-7949-830C-AE8AF1230416}" type="datetimeFigureOut">
               <a:rPr lang="en-US" smtClean="0"/>
-              <a:t>9/22/17</a:t>
+              <a:t>9/25/17</a:t>
             </a:fld>
             <a:endParaRPr lang="en-US" dirty="0"/>
           </a:p>
@@ -1237,7 +1242,7 @@
           <a:p>
             <a:fld id="{1214027B-283B-7949-830C-AE8AF1230416}" type="datetimeFigureOut">
               <a:rPr lang="en-US" smtClean="0"/>
-              <a:t>9/22/17</a:t>
+              <a:t>9/25/17</a:t>
             </a:fld>
             <a:endParaRPr lang="en-US" dirty="0"/>
           </a:p>
@@ -1604,7 +1609,7 @@
           <a:p>
             <a:fld id="{1214027B-283B-7949-830C-AE8AF1230416}" type="datetimeFigureOut">
               <a:rPr lang="en-US" smtClean="0"/>
-              <a:t>9/22/17</a:t>
+              <a:t>9/25/17</a:t>
             </a:fld>
             <a:endParaRPr lang="en-US" dirty="0"/>
           </a:p>
@@ -1722,7 +1727,7 @@
           <a:p>
             <a:fld id="{1214027B-283B-7949-830C-AE8AF1230416}" type="datetimeFigureOut">
               <a:rPr lang="en-US" smtClean="0"/>
-              <a:t>9/22/17</a:t>
+              <a:t>9/25/17</a:t>
             </a:fld>
             <a:endParaRPr lang="en-US" dirty="0"/>
           </a:p>
@@ -1817,7 +1822,7 @@
           <a:p>
             <a:fld id="{1214027B-283B-7949-830C-AE8AF1230416}" type="datetimeFigureOut">
               <a:rPr lang="en-US" smtClean="0"/>
-              <a:t>9/22/17</a:t>
+              <a:t>9/25/17</a:t>
             </a:fld>
             <a:endParaRPr lang="en-US" dirty="0"/>
           </a:p>
@@ -2094,7 +2099,7 @@
           <a:p>
             <a:fld id="{1214027B-283B-7949-830C-AE8AF1230416}" type="datetimeFigureOut">
               <a:rPr lang="en-US" smtClean="0"/>
-              <a:t>9/22/17</a:t>
+              <a:t>9/25/17</a:t>
             </a:fld>
             <a:endParaRPr lang="en-US" dirty="0"/>
           </a:p>
@@ -2347,7 +2352,7 @@
           <a:p>
             <a:fld id="{1214027B-283B-7949-830C-AE8AF1230416}" type="datetimeFigureOut">
               <a:rPr lang="en-US" smtClean="0"/>
-              <a:t>9/22/17</a:t>
+              <a:t>9/25/17</a:t>
             </a:fld>
             <a:endParaRPr lang="en-US" dirty="0"/>
           </a:p>
@@ -2560,7 +2565,7 @@
           <a:p>
             <a:fld id="{1214027B-283B-7949-830C-AE8AF1230416}" type="datetimeFigureOut">
               <a:rPr lang="en-US" smtClean="0"/>
-              <a:t>9/22/17</a:t>
+              <a:t>9/25/17</a:t>
             </a:fld>
             <a:endParaRPr lang="en-US" dirty="0"/>
           </a:p>
@@ -3044,736 +3049,6 @@
       </p:grpSpPr>
       <p:sp>
         <p:nvSpPr>
-          <p:cNvPr id="4" name="Rounded Rectangle 3"/>
-          <p:cNvSpPr/>
-          <p:nvPr/>
-        </p:nvSpPr>
-        <p:spPr>
-          <a:xfrm>
-            <a:off x="948916" y="2199490"/>
-            <a:ext cx="2656800" cy="357440"/>
-          </a:xfrm>
-          <a:prstGeom prst="roundRect">
-            <a:avLst/>
-          </a:prstGeom>
-        </p:spPr>
-        <p:style>
-          <a:lnRef idx="2">
-            <a:schemeClr val="accent1">
-              <a:shade val="50000"/>
-            </a:schemeClr>
-          </a:lnRef>
-          <a:fillRef idx="1">
-            <a:schemeClr val="accent1"/>
-          </a:fillRef>
-          <a:effectRef idx="0">
-            <a:schemeClr val="accent1"/>
-          </a:effectRef>
-          <a:fontRef idx="minor">
-            <a:schemeClr val="lt1"/>
-          </a:fontRef>
-        </p:style>
-        <p:txBody>
-          <a:bodyPr rtlCol="0" anchor="ctr"/>
-          <a:lstStyle/>
-          <a:p>
-            <a:pPr algn="ctr"/>
-            <a:r>
-              <a:rPr lang="en-US" dirty="0" smtClean="0"/>
-              <a:t>core</a:t>
-            </a:r>
-            <a:endParaRPr lang="en-US" dirty="0"/>
-          </a:p>
-        </p:txBody>
-      </p:sp>
-      <p:sp>
-        <p:nvSpPr>
-          <p:cNvPr id="7" name="Rounded Rectangle 6"/>
-          <p:cNvSpPr/>
-          <p:nvPr/>
-        </p:nvSpPr>
-        <p:spPr>
-          <a:xfrm>
-            <a:off x="3604527" y="2199490"/>
-            <a:ext cx="3037788" cy="357440"/>
-          </a:xfrm>
-          <a:prstGeom prst="roundRect">
-            <a:avLst/>
-          </a:prstGeom>
-        </p:spPr>
-        <p:style>
-          <a:lnRef idx="1">
-            <a:schemeClr val="accent1"/>
-          </a:lnRef>
-          <a:fillRef idx="2">
-            <a:schemeClr val="accent1"/>
-          </a:fillRef>
-          <a:effectRef idx="1">
-            <a:schemeClr val="accent1"/>
-          </a:effectRef>
-          <a:fontRef idx="minor">
-            <a:schemeClr val="dk1"/>
-          </a:fontRef>
-        </p:style>
-        <p:txBody>
-          <a:bodyPr rtlCol="0" anchor="ctr"/>
-          <a:lstStyle/>
-          <a:p>
-            <a:pPr algn="ctr"/>
-            <a:r>
-              <a:rPr lang="en-US" dirty="0" smtClean="0"/>
-              <a:t>core-ui </a:t>
-            </a:r>
-            <a:endParaRPr lang="en-US" dirty="0"/>
-          </a:p>
-        </p:txBody>
-      </p:sp>
-      <p:sp>
-        <p:nvSpPr>
-          <p:cNvPr id="8" name="Rounded Rectangle 7"/>
-          <p:cNvSpPr/>
-          <p:nvPr/>
-        </p:nvSpPr>
-        <p:spPr>
-          <a:xfrm rot="16200000">
-            <a:off x="485616" y="3390640"/>
-            <a:ext cx="2042603" cy="375177"/>
-          </a:xfrm>
-          <a:prstGeom prst="roundRect">
-            <a:avLst/>
-          </a:prstGeom>
-        </p:spPr>
-        <p:style>
-          <a:lnRef idx="2">
-            <a:schemeClr val="accent1">
-              <a:shade val="50000"/>
-            </a:schemeClr>
-          </a:lnRef>
-          <a:fillRef idx="1">
-            <a:schemeClr val="accent1"/>
-          </a:fillRef>
-          <a:effectRef idx="0">
-            <a:schemeClr val="accent1"/>
-          </a:effectRef>
-          <a:fontRef idx="minor">
-            <a:schemeClr val="lt1"/>
-          </a:fontRef>
-        </p:style>
-        <p:txBody>
-          <a:bodyPr rtlCol="0" anchor="ctr"/>
-          <a:lstStyle/>
-          <a:p>
-            <a:pPr algn="ctr"/>
-            <a:r>
-              <a:rPr lang="en-US" dirty="0" smtClean="0"/>
-              <a:t>logging</a:t>
-            </a:r>
-            <a:endParaRPr lang="en-US" dirty="0"/>
-          </a:p>
-        </p:txBody>
-      </p:sp>
-      <p:sp>
-        <p:nvSpPr>
-          <p:cNvPr id="9" name="Rounded Rectangle 8"/>
-          <p:cNvSpPr/>
-          <p:nvPr/>
-        </p:nvSpPr>
-        <p:spPr>
-          <a:xfrm rot="16200000">
-            <a:off x="862396" y="3395126"/>
-            <a:ext cx="2051567" cy="375177"/>
-          </a:xfrm>
-          <a:prstGeom prst="roundRect">
-            <a:avLst/>
-          </a:prstGeom>
-        </p:spPr>
-        <p:style>
-          <a:lnRef idx="2">
-            <a:schemeClr val="accent1">
-              <a:shade val="50000"/>
-            </a:schemeClr>
-          </a:lnRef>
-          <a:fillRef idx="1">
-            <a:schemeClr val="accent1"/>
-          </a:fillRef>
-          <a:effectRef idx="0">
-            <a:schemeClr val="accent1"/>
-          </a:effectRef>
-          <a:fontRef idx="minor">
-            <a:schemeClr val="lt1"/>
-          </a:fontRef>
-        </p:style>
-        <p:txBody>
-          <a:bodyPr rtlCol="0" anchor="ctr"/>
-          <a:lstStyle/>
-          <a:p>
-            <a:pPr algn="ctr"/>
-            <a:r>
-              <a:rPr lang="en-US" dirty="0" smtClean="0"/>
-              <a:t>preferences</a:t>
-            </a:r>
-            <a:endParaRPr lang="en-US" dirty="0"/>
-          </a:p>
-        </p:txBody>
-      </p:sp>
-      <p:sp>
-        <p:nvSpPr>
-          <p:cNvPr id="10" name="Rounded Rectangle 9"/>
-          <p:cNvSpPr/>
-          <p:nvPr/>
-        </p:nvSpPr>
-        <p:spPr>
-          <a:xfrm rot="16200000">
-            <a:off x="1239952" y="3390642"/>
-            <a:ext cx="2042600" cy="375177"/>
-          </a:xfrm>
-          <a:prstGeom prst="roundRect">
-            <a:avLst/>
-          </a:prstGeom>
-        </p:spPr>
-        <p:style>
-          <a:lnRef idx="2">
-            <a:schemeClr val="accent1">
-              <a:shade val="50000"/>
-            </a:schemeClr>
-          </a:lnRef>
-          <a:fillRef idx="1">
-            <a:schemeClr val="accent1"/>
-          </a:fillRef>
-          <a:effectRef idx="0">
-            <a:schemeClr val="accent1"/>
-          </a:effectRef>
-          <a:fontRef idx="minor">
-            <a:schemeClr val="lt1"/>
-          </a:fontRef>
-        </p:style>
-        <p:txBody>
-          <a:bodyPr rtlCol="0" anchor="ctr"/>
-          <a:lstStyle/>
-          <a:p>
-            <a:pPr algn="ctr"/>
-            <a:r>
-              <a:rPr lang="en-US" dirty="0" smtClean="0"/>
-              <a:t>persistence</a:t>
-            </a:r>
-            <a:endParaRPr lang="en-US" dirty="0"/>
-          </a:p>
-        </p:txBody>
-      </p:sp>
-      <p:sp>
-        <p:nvSpPr>
-          <p:cNvPr id="11" name="Rounded Rectangle 10"/>
-          <p:cNvSpPr/>
-          <p:nvPr/>
-        </p:nvSpPr>
-        <p:spPr>
-          <a:xfrm rot="16200000">
-            <a:off x="1619178" y="3395126"/>
-            <a:ext cx="2051568" cy="375177"/>
-          </a:xfrm>
-          <a:prstGeom prst="roundRect">
-            <a:avLst/>
-          </a:prstGeom>
-        </p:spPr>
-        <p:style>
-          <a:lnRef idx="2">
-            <a:schemeClr val="accent1">
-              <a:shade val="50000"/>
-            </a:schemeClr>
-          </a:lnRef>
-          <a:fillRef idx="1">
-            <a:schemeClr val="accent1"/>
-          </a:fillRef>
-          <a:effectRef idx="0">
-            <a:schemeClr val="accent1"/>
-          </a:effectRef>
-          <a:fontRef idx="minor">
-            <a:schemeClr val="lt1"/>
-          </a:fontRef>
-        </p:style>
-        <p:txBody>
-          <a:bodyPr rtlCol="0" anchor="ctr"/>
-          <a:lstStyle/>
-          <a:p>
-            <a:pPr algn="ctr"/>
-            <a:r>
-              <a:rPr lang="en-US" dirty="0" smtClean="0"/>
-              <a:t>jobs</a:t>
-            </a:r>
-            <a:endParaRPr lang="en-US" dirty="0"/>
-          </a:p>
-        </p:txBody>
-      </p:sp>
-      <p:sp>
-        <p:nvSpPr>
-          <p:cNvPr id="12" name="Rounded Rectangle 11"/>
-          <p:cNvSpPr/>
-          <p:nvPr/>
-        </p:nvSpPr>
-        <p:spPr>
-          <a:xfrm rot="16200000">
-            <a:off x="2185914" y="3199339"/>
-            <a:ext cx="1676398" cy="391572"/>
-          </a:xfrm>
-          <a:prstGeom prst="roundRect">
-            <a:avLst/>
-          </a:prstGeom>
-        </p:spPr>
-        <p:style>
-          <a:lnRef idx="2">
-            <a:schemeClr val="accent1">
-              <a:shade val="50000"/>
-            </a:schemeClr>
-          </a:lnRef>
-          <a:fillRef idx="1">
-            <a:schemeClr val="accent1"/>
-          </a:fillRef>
-          <a:effectRef idx="0">
-            <a:schemeClr val="accent1"/>
-          </a:effectRef>
-          <a:fontRef idx="minor">
-            <a:schemeClr val="lt1"/>
-          </a:fontRef>
-        </p:style>
-        <p:txBody>
-          <a:bodyPr rtlCol="0" anchor="ctr"/>
-          <a:lstStyle/>
-          <a:p>
-            <a:pPr algn="ctr"/>
-            <a:r>
-              <a:rPr lang="en-US" dirty="0" smtClean="0"/>
-              <a:t>pv</a:t>
-            </a:r>
-            <a:endParaRPr lang="en-US" dirty="0"/>
-          </a:p>
-        </p:txBody>
-      </p:sp>
-      <p:sp>
-        <p:nvSpPr>
-          <p:cNvPr id="13" name="Rounded Rectangle 12"/>
-          <p:cNvSpPr/>
-          <p:nvPr/>
-        </p:nvSpPr>
-        <p:spPr>
-          <a:xfrm rot="16200000">
-            <a:off x="2571731" y="3199338"/>
-            <a:ext cx="1676397" cy="391572"/>
-          </a:xfrm>
-          <a:prstGeom prst="roundRect">
-            <a:avLst/>
-          </a:prstGeom>
-        </p:spPr>
-        <p:style>
-          <a:lnRef idx="2">
-            <a:schemeClr val="accent1">
-              <a:shade val="50000"/>
-            </a:schemeClr>
-          </a:lnRef>
-          <a:fillRef idx="1">
-            <a:schemeClr val="accent1"/>
-          </a:fillRef>
-          <a:effectRef idx="0">
-            <a:schemeClr val="accent1"/>
-          </a:effectRef>
-          <a:fontRef idx="minor">
-            <a:schemeClr val="lt1"/>
-          </a:fontRef>
-        </p:style>
-        <p:txBody>
-          <a:bodyPr rtlCol="0" anchor="ctr"/>
-          <a:lstStyle/>
-          <a:p>
-            <a:pPr algn="ctr"/>
-            <a:r>
-              <a:rPr lang="en-US" dirty="0" smtClean="0"/>
-              <a:t>archive</a:t>
-            </a:r>
-            <a:endParaRPr lang="en-US" dirty="0"/>
-          </a:p>
-        </p:txBody>
-      </p:sp>
-      <p:sp>
-        <p:nvSpPr>
-          <p:cNvPr id="14" name="Rounded Rectangle 13"/>
-          <p:cNvSpPr/>
-          <p:nvPr/>
-        </p:nvSpPr>
-        <p:spPr>
-          <a:xfrm>
-            <a:off x="2830897" y="4242290"/>
-            <a:ext cx="766491" cy="357242"/>
-          </a:xfrm>
-          <a:prstGeom prst="roundRect">
-            <a:avLst/>
-          </a:prstGeom>
-        </p:spPr>
-        <p:style>
-          <a:lnRef idx="2">
-            <a:schemeClr val="accent1">
-              <a:shade val="50000"/>
-            </a:schemeClr>
-          </a:lnRef>
-          <a:fillRef idx="1">
-            <a:schemeClr val="accent1"/>
-          </a:fillRef>
-          <a:effectRef idx="0">
-            <a:schemeClr val="accent1"/>
-          </a:effectRef>
-          <a:fontRef idx="minor">
-            <a:schemeClr val="lt1"/>
-          </a:fontRef>
-        </p:style>
-        <p:txBody>
-          <a:bodyPr rtlCol="0" anchor="ctr"/>
-          <a:lstStyle/>
-          <a:p>
-            <a:pPr algn="ctr"/>
-            <a:r>
-              <a:rPr lang="en-US" dirty="0" smtClean="0"/>
-              <a:t>value</a:t>
-            </a:r>
-            <a:endParaRPr lang="en-US" dirty="0"/>
-          </a:p>
-        </p:txBody>
-      </p:sp>
-      <p:sp>
-        <p:nvSpPr>
-          <p:cNvPr id="15" name="Rounded Rectangle 14"/>
-          <p:cNvSpPr/>
-          <p:nvPr/>
-        </p:nvSpPr>
-        <p:spPr>
-          <a:xfrm rot="16200000">
-            <a:off x="2964119" y="3207541"/>
-            <a:ext cx="1676395" cy="375177"/>
-          </a:xfrm>
-          <a:prstGeom prst="roundRect">
-            <a:avLst/>
-          </a:prstGeom>
-        </p:spPr>
-        <p:style>
-          <a:lnRef idx="1">
-            <a:schemeClr val="accent1"/>
-          </a:lnRef>
-          <a:fillRef idx="2">
-            <a:schemeClr val="accent1"/>
-          </a:fillRef>
-          <a:effectRef idx="1">
-            <a:schemeClr val="accent1"/>
-          </a:effectRef>
-          <a:fontRef idx="minor">
-            <a:schemeClr val="dk1"/>
-          </a:fontRef>
-        </p:style>
-        <p:txBody>
-          <a:bodyPr rtlCol="0" anchor="ctr"/>
-          <a:lstStyle/>
-          <a:p>
-            <a:pPr algn="ctr"/>
-            <a:r>
-              <a:rPr lang="en-US" dirty="0" smtClean="0"/>
-              <a:t>docking</a:t>
-            </a:r>
-            <a:endParaRPr lang="en-US" dirty="0"/>
-          </a:p>
-        </p:txBody>
-      </p:sp>
-      <p:sp>
-        <p:nvSpPr>
-          <p:cNvPr id="16" name="Rounded Rectangle 15"/>
-          <p:cNvSpPr/>
-          <p:nvPr/>
-        </p:nvSpPr>
-        <p:spPr>
-          <a:xfrm rot="16200000">
-            <a:off x="3348856" y="3198569"/>
-            <a:ext cx="1676395" cy="375177"/>
-          </a:xfrm>
-          <a:prstGeom prst="roundRect">
-            <a:avLst/>
-          </a:prstGeom>
-        </p:spPr>
-        <p:style>
-          <a:lnRef idx="1">
-            <a:schemeClr val="accent1"/>
-          </a:lnRef>
-          <a:fillRef idx="2">
-            <a:schemeClr val="accent1"/>
-          </a:fillRef>
-          <a:effectRef idx="1">
-            <a:schemeClr val="accent1"/>
-          </a:effectRef>
-          <a:fontRef idx="minor">
-            <a:schemeClr val="dk1"/>
-          </a:fontRef>
-        </p:style>
-        <p:txBody>
-          <a:bodyPr rtlCol="0" anchor="ctr"/>
-          <a:lstStyle/>
-          <a:p>
-            <a:pPr algn="ctr"/>
-            <a:r>
-              <a:rPr lang="en-US" dirty="0" smtClean="0"/>
-              <a:t>selection</a:t>
-            </a:r>
-            <a:endParaRPr lang="en-US" dirty="0"/>
-          </a:p>
-        </p:txBody>
-      </p:sp>
-      <p:sp>
-        <p:nvSpPr>
-          <p:cNvPr id="17" name="Rounded Rectangle 16"/>
-          <p:cNvSpPr/>
-          <p:nvPr/>
-        </p:nvSpPr>
-        <p:spPr>
-          <a:xfrm rot="16200000">
-            <a:off x="3722449" y="3198567"/>
-            <a:ext cx="1676395" cy="375177"/>
-          </a:xfrm>
-          <a:prstGeom prst="roundRect">
-            <a:avLst/>
-          </a:prstGeom>
-        </p:spPr>
-        <p:style>
-          <a:lnRef idx="1">
-            <a:schemeClr val="accent1"/>
-          </a:lnRef>
-          <a:fillRef idx="2">
-            <a:schemeClr val="accent1"/>
-          </a:fillRef>
-          <a:effectRef idx="1">
-            <a:schemeClr val="accent1"/>
-          </a:effectRef>
-          <a:fontRef idx="minor">
-            <a:schemeClr val="dk1"/>
-          </a:fontRef>
-        </p:style>
-        <p:txBody>
-          <a:bodyPr rtlCol="0" anchor="ctr"/>
-          <a:lstStyle/>
-          <a:p>
-            <a:pPr algn="ctr"/>
-            <a:r>
-              <a:rPr lang="en-US" dirty="0" smtClean="0"/>
-              <a:t>toolbar</a:t>
-            </a:r>
-            <a:endParaRPr lang="en-US" dirty="0"/>
-          </a:p>
-        </p:txBody>
-      </p:sp>
-      <p:sp>
-        <p:nvSpPr>
-          <p:cNvPr id="18" name="Rounded Rectangle 17"/>
-          <p:cNvSpPr/>
-          <p:nvPr/>
-        </p:nvSpPr>
-        <p:spPr>
-          <a:xfrm rot="16200000">
-            <a:off x="4105230" y="3198566"/>
-            <a:ext cx="1676395" cy="375177"/>
-          </a:xfrm>
-          <a:prstGeom prst="roundRect">
-            <a:avLst/>
-          </a:prstGeom>
-        </p:spPr>
-        <p:style>
-          <a:lnRef idx="1">
-            <a:schemeClr val="accent1"/>
-          </a:lnRef>
-          <a:fillRef idx="2">
-            <a:schemeClr val="accent1"/>
-          </a:fillRef>
-          <a:effectRef idx="1">
-            <a:schemeClr val="accent1"/>
-          </a:effectRef>
-          <a:fontRef idx="minor">
-            <a:schemeClr val="dk1"/>
-          </a:fontRef>
-        </p:style>
-        <p:txBody>
-          <a:bodyPr rtlCol="0" anchor="ctr"/>
-          <a:lstStyle/>
-          <a:p>
-            <a:pPr algn="ctr"/>
-            <a:r>
-              <a:rPr lang="en-US" dirty="0" smtClean="0"/>
-              <a:t>menu</a:t>
-            </a:r>
-            <a:endParaRPr lang="en-US" dirty="0"/>
-          </a:p>
-        </p:txBody>
-      </p:sp>
-      <p:sp>
-        <p:nvSpPr>
-          <p:cNvPr id="19" name="Rounded Rectangle 18"/>
-          <p:cNvSpPr/>
-          <p:nvPr/>
-        </p:nvSpPr>
-        <p:spPr>
-          <a:xfrm rot="16200000">
-            <a:off x="5221048" y="3213335"/>
-            <a:ext cx="1676395" cy="375177"/>
-          </a:xfrm>
-          <a:prstGeom prst="roundRect">
-            <a:avLst/>
-          </a:prstGeom>
-        </p:spPr>
-        <p:style>
-          <a:lnRef idx="1">
-            <a:schemeClr val="accent1"/>
-          </a:lnRef>
-          <a:fillRef idx="2">
-            <a:schemeClr val="accent1"/>
-          </a:fillRef>
-          <a:effectRef idx="1">
-            <a:schemeClr val="accent1"/>
-          </a:effectRef>
-          <a:fontRef idx="minor">
-            <a:schemeClr val="dk1"/>
-          </a:fontRef>
-        </p:style>
-        <p:txBody>
-          <a:bodyPr rtlCol="0" anchor="ctr"/>
-          <a:lstStyle/>
-          <a:p>
-            <a:pPr algn="ctr"/>
-            <a:r>
-              <a:rPr lang="en-US" dirty="0" smtClean="0"/>
-              <a:t>job viewer</a:t>
-            </a:r>
-            <a:endParaRPr lang="en-US" dirty="0"/>
-          </a:p>
-        </p:txBody>
-      </p:sp>
-      <p:sp>
-        <p:nvSpPr>
-          <p:cNvPr id="20" name="Rounded Rectangle 19"/>
-          <p:cNvSpPr/>
-          <p:nvPr/>
-        </p:nvSpPr>
-        <p:spPr>
-          <a:xfrm rot="16200000">
-            <a:off x="5600639" y="3207535"/>
-            <a:ext cx="1676395" cy="375177"/>
-          </a:xfrm>
-          <a:prstGeom prst="roundRect">
-            <a:avLst/>
-          </a:prstGeom>
-        </p:spPr>
-        <p:style>
-          <a:lnRef idx="1">
-            <a:schemeClr val="accent1"/>
-          </a:lnRef>
-          <a:fillRef idx="2">
-            <a:schemeClr val="accent1"/>
-          </a:fillRef>
-          <a:effectRef idx="1">
-            <a:schemeClr val="accent1"/>
-          </a:effectRef>
-          <a:fontRef idx="minor">
-            <a:schemeClr val="dk1"/>
-          </a:fontRef>
-        </p:style>
-        <p:txBody>
-          <a:bodyPr rtlCol="0" anchor="ctr"/>
-          <a:lstStyle/>
-          <a:p>
-            <a:pPr algn="ctr"/>
-            <a:r>
-              <a:rPr lang="en-US" dirty="0" smtClean="0"/>
-              <a:t>pv list</a:t>
-            </a:r>
-            <a:endParaRPr lang="en-US" dirty="0"/>
-          </a:p>
-        </p:txBody>
-      </p:sp>
-      <p:sp>
-        <p:nvSpPr>
-          <p:cNvPr id="21" name="Rounded Rectangle 20"/>
-          <p:cNvSpPr/>
-          <p:nvPr/>
-        </p:nvSpPr>
-        <p:spPr>
-          <a:xfrm rot="16200000">
-            <a:off x="4481683" y="3198566"/>
-            <a:ext cx="1676395" cy="375177"/>
-          </a:xfrm>
-          <a:prstGeom prst="roundRect">
-            <a:avLst/>
-          </a:prstGeom>
-        </p:spPr>
-        <p:style>
-          <a:lnRef idx="1">
-            <a:schemeClr val="accent1"/>
-          </a:lnRef>
-          <a:fillRef idx="2">
-            <a:schemeClr val="accent1"/>
-          </a:fillRef>
-          <a:effectRef idx="1">
-            <a:schemeClr val="accent1"/>
-          </a:effectRef>
-          <a:fontRef idx="minor">
-            <a:schemeClr val="dk1"/>
-          </a:fontRef>
-        </p:style>
-        <p:txBody>
-          <a:bodyPr rtlCol="0" anchor="ctr"/>
-          <a:lstStyle/>
-          <a:p>
-            <a:pPr algn="ctr"/>
-            <a:r>
-              <a:rPr lang="en-US" dirty="0" smtClean="0"/>
-              <a:t>context  menu</a:t>
-            </a:r>
-            <a:endParaRPr lang="en-US" dirty="0"/>
-          </a:p>
-        </p:txBody>
-      </p:sp>
-      <p:sp>
-        <p:nvSpPr>
-          <p:cNvPr id="24" name="Rounded Rectangle 23"/>
-          <p:cNvSpPr/>
-          <p:nvPr/>
-        </p:nvSpPr>
-        <p:spPr>
-          <a:xfrm>
-            <a:off x="3599893" y="4233323"/>
-            <a:ext cx="3026531" cy="375177"/>
-          </a:xfrm>
-          <a:prstGeom prst="roundRect">
-            <a:avLst/>
-          </a:prstGeom>
-        </p:spPr>
-        <p:style>
-          <a:lnRef idx="1">
-            <a:schemeClr val="accent1"/>
-          </a:lnRef>
-          <a:fillRef idx="2">
-            <a:schemeClr val="accent1"/>
-          </a:fillRef>
-          <a:effectRef idx="1">
-            <a:schemeClr val="accent1"/>
-          </a:effectRef>
-          <a:fontRef idx="minor">
-            <a:schemeClr val="dk1"/>
-          </a:fontRef>
-        </p:style>
-        <p:txBody>
-          <a:bodyPr rtlCol="0" anchor="ctr"/>
-          <a:lstStyle/>
-          <a:p>
-            <a:pPr algn="ctr"/>
-            <a:r>
-              <a:rPr lang="en-US" dirty="0" smtClean="0"/>
-              <a:t>javafx</a:t>
-            </a:r>
-            <a:endParaRPr lang="en-US" dirty="0"/>
-          </a:p>
-        </p:txBody>
-      </p:sp>
-      <p:sp>
-        <p:nvSpPr>
           <p:cNvPr id="25" name="Rounded Rectangle 24"/>
           <p:cNvSpPr/>
           <p:nvPr/>
@@ -3781,7 +3056,7 @@
         <p:spPr>
           <a:xfrm>
             <a:off x="948915" y="4617466"/>
-            <a:ext cx="5677509" cy="375177"/>
+            <a:ext cx="5677509" cy="741370"/>
           </a:xfrm>
           <a:prstGeom prst="roundRect">
             <a:avLst/>
@@ -3806,13 +3081,755 @@
           <a:lstStyle/>
           <a:p>
             <a:pPr algn="ctr"/>
+            <a:endParaRPr lang="en-US" dirty="0"/>
+          </a:p>
+          <a:p>
+            <a:pPr algn="ctr"/>
             <a:r>
               <a:rPr lang="en-US" dirty="0"/>
-              <a:t>j</a:t>
+              <a:t>J</a:t>
             </a:r>
             <a:r>
               <a:rPr lang="en-US" dirty="0" smtClean="0"/>
-              <a:t>ava 9</a:t>
+              <a:t>ava </a:t>
+            </a:r>
+            <a:r>
+              <a:rPr lang="en-US" dirty="0" smtClean="0"/>
+              <a:t>9</a:t>
+            </a:r>
+            <a:endParaRPr lang="en-US" dirty="0"/>
+          </a:p>
+        </p:txBody>
+      </p:sp>
+      <p:sp>
+        <p:nvSpPr>
+          <p:cNvPr id="4" name="Rounded Rectangle 3"/>
+          <p:cNvSpPr/>
+          <p:nvPr/>
+        </p:nvSpPr>
+        <p:spPr>
+          <a:xfrm>
+            <a:off x="948916" y="2199490"/>
+            <a:ext cx="2656800" cy="357440"/>
+          </a:xfrm>
+          <a:prstGeom prst="roundRect">
+            <a:avLst/>
+          </a:prstGeom>
+        </p:spPr>
+        <p:style>
+          <a:lnRef idx="2">
+            <a:schemeClr val="accent1">
+              <a:shade val="50000"/>
+            </a:schemeClr>
+          </a:lnRef>
+          <a:fillRef idx="1">
+            <a:schemeClr val="accent1"/>
+          </a:fillRef>
+          <a:effectRef idx="0">
+            <a:schemeClr val="accent1"/>
+          </a:effectRef>
+          <a:fontRef idx="minor">
+            <a:schemeClr val="lt1"/>
+          </a:fontRef>
+        </p:style>
+        <p:txBody>
+          <a:bodyPr rtlCol="0" anchor="ctr"/>
+          <a:lstStyle/>
+          <a:p>
+            <a:pPr algn="ctr"/>
+            <a:r>
+              <a:rPr lang="en-US" dirty="0" smtClean="0"/>
+              <a:t>core</a:t>
+            </a:r>
+            <a:endParaRPr lang="en-US" dirty="0"/>
+          </a:p>
+        </p:txBody>
+      </p:sp>
+      <p:sp>
+        <p:nvSpPr>
+          <p:cNvPr id="7" name="Rounded Rectangle 6"/>
+          <p:cNvSpPr/>
+          <p:nvPr/>
+        </p:nvSpPr>
+        <p:spPr>
+          <a:xfrm>
+            <a:off x="3604527" y="2199490"/>
+            <a:ext cx="3037788" cy="357440"/>
+          </a:xfrm>
+          <a:prstGeom prst="roundRect">
+            <a:avLst/>
+          </a:prstGeom>
+        </p:spPr>
+        <p:style>
+          <a:lnRef idx="1">
+            <a:schemeClr val="accent1"/>
+          </a:lnRef>
+          <a:fillRef idx="2">
+            <a:schemeClr val="accent1"/>
+          </a:fillRef>
+          <a:effectRef idx="1">
+            <a:schemeClr val="accent1"/>
+          </a:effectRef>
+          <a:fontRef idx="minor">
+            <a:schemeClr val="dk1"/>
+          </a:fontRef>
+        </p:style>
+        <p:txBody>
+          <a:bodyPr rtlCol="0" anchor="ctr"/>
+          <a:lstStyle/>
+          <a:p>
+            <a:pPr algn="ctr"/>
+            <a:r>
+              <a:rPr lang="en-US" dirty="0" smtClean="0"/>
+              <a:t>core-ui </a:t>
+            </a:r>
+            <a:endParaRPr lang="en-US" dirty="0"/>
+          </a:p>
+        </p:txBody>
+      </p:sp>
+      <p:sp>
+        <p:nvSpPr>
+          <p:cNvPr id="8" name="Rounded Rectangle 7"/>
+          <p:cNvSpPr/>
+          <p:nvPr/>
+        </p:nvSpPr>
+        <p:spPr>
+          <a:xfrm rot="16200000">
+            <a:off x="485616" y="3390640"/>
+            <a:ext cx="2042603" cy="375177"/>
+          </a:xfrm>
+          <a:prstGeom prst="roundRect">
+            <a:avLst/>
+          </a:prstGeom>
+        </p:spPr>
+        <p:style>
+          <a:lnRef idx="2">
+            <a:schemeClr val="accent1">
+              <a:shade val="50000"/>
+            </a:schemeClr>
+          </a:lnRef>
+          <a:fillRef idx="1">
+            <a:schemeClr val="accent1"/>
+          </a:fillRef>
+          <a:effectRef idx="0">
+            <a:schemeClr val="accent1"/>
+          </a:effectRef>
+          <a:fontRef idx="minor">
+            <a:schemeClr val="lt1"/>
+          </a:fontRef>
+        </p:style>
+        <p:txBody>
+          <a:bodyPr rtlCol="0" anchor="ctr"/>
+          <a:lstStyle/>
+          <a:p>
+            <a:pPr algn="ctr"/>
+            <a:r>
+              <a:rPr lang="en-US" dirty="0" smtClean="0"/>
+              <a:t>Logging</a:t>
+            </a:r>
+            <a:endParaRPr lang="en-US" dirty="0"/>
+          </a:p>
+        </p:txBody>
+      </p:sp>
+      <p:sp>
+        <p:nvSpPr>
+          <p:cNvPr id="9" name="Rounded Rectangle 8"/>
+          <p:cNvSpPr/>
+          <p:nvPr/>
+        </p:nvSpPr>
+        <p:spPr>
+          <a:xfrm rot="16200000">
+            <a:off x="862396" y="3395126"/>
+            <a:ext cx="2051567" cy="375177"/>
+          </a:xfrm>
+          <a:prstGeom prst="roundRect">
+            <a:avLst/>
+          </a:prstGeom>
+        </p:spPr>
+        <p:style>
+          <a:lnRef idx="2">
+            <a:schemeClr val="accent1">
+              <a:shade val="50000"/>
+            </a:schemeClr>
+          </a:lnRef>
+          <a:fillRef idx="1">
+            <a:schemeClr val="accent1"/>
+          </a:fillRef>
+          <a:effectRef idx="0">
+            <a:schemeClr val="accent1"/>
+          </a:effectRef>
+          <a:fontRef idx="minor">
+            <a:schemeClr val="lt1"/>
+          </a:fontRef>
+        </p:style>
+        <p:txBody>
+          <a:bodyPr rtlCol="0" anchor="ctr"/>
+          <a:lstStyle/>
+          <a:p>
+            <a:pPr algn="ctr"/>
+            <a:r>
+              <a:rPr lang="en-US" dirty="0" smtClean="0"/>
+              <a:t>Preferences</a:t>
+            </a:r>
+            <a:endParaRPr lang="en-US" dirty="0"/>
+          </a:p>
+        </p:txBody>
+      </p:sp>
+      <p:sp>
+        <p:nvSpPr>
+          <p:cNvPr id="10" name="Rounded Rectangle 9"/>
+          <p:cNvSpPr/>
+          <p:nvPr/>
+        </p:nvSpPr>
+        <p:spPr>
+          <a:xfrm rot="16200000">
+            <a:off x="1239952" y="3390642"/>
+            <a:ext cx="2042600" cy="375177"/>
+          </a:xfrm>
+          <a:prstGeom prst="roundRect">
+            <a:avLst/>
+          </a:prstGeom>
+        </p:spPr>
+        <p:style>
+          <a:lnRef idx="2">
+            <a:schemeClr val="accent1">
+              <a:shade val="50000"/>
+            </a:schemeClr>
+          </a:lnRef>
+          <a:fillRef idx="1">
+            <a:schemeClr val="accent1"/>
+          </a:fillRef>
+          <a:effectRef idx="0">
+            <a:schemeClr val="accent1"/>
+          </a:effectRef>
+          <a:fontRef idx="minor">
+            <a:schemeClr val="lt1"/>
+          </a:fontRef>
+        </p:style>
+        <p:txBody>
+          <a:bodyPr rtlCol="0" anchor="ctr"/>
+          <a:lstStyle/>
+          <a:p>
+            <a:pPr algn="ctr"/>
+            <a:r>
+              <a:rPr lang="en-US" dirty="0" smtClean="0"/>
+              <a:t>Persistence</a:t>
+            </a:r>
+            <a:endParaRPr lang="en-US" dirty="0"/>
+          </a:p>
+        </p:txBody>
+      </p:sp>
+      <p:sp>
+        <p:nvSpPr>
+          <p:cNvPr id="11" name="Rounded Rectangle 10"/>
+          <p:cNvSpPr/>
+          <p:nvPr/>
+        </p:nvSpPr>
+        <p:spPr>
+          <a:xfrm rot="16200000">
+            <a:off x="1619178" y="3395126"/>
+            <a:ext cx="2051568" cy="375177"/>
+          </a:xfrm>
+          <a:prstGeom prst="roundRect">
+            <a:avLst/>
+          </a:prstGeom>
+        </p:spPr>
+        <p:style>
+          <a:lnRef idx="2">
+            <a:schemeClr val="accent1">
+              <a:shade val="50000"/>
+            </a:schemeClr>
+          </a:lnRef>
+          <a:fillRef idx="1">
+            <a:schemeClr val="accent1"/>
+          </a:fillRef>
+          <a:effectRef idx="0">
+            <a:schemeClr val="accent1"/>
+          </a:effectRef>
+          <a:fontRef idx="minor">
+            <a:schemeClr val="lt1"/>
+          </a:fontRef>
+        </p:style>
+        <p:txBody>
+          <a:bodyPr rtlCol="0" anchor="ctr"/>
+          <a:lstStyle/>
+          <a:p>
+            <a:pPr algn="ctr"/>
+            <a:r>
+              <a:rPr lang="en-US" dirty="0" smtClean="0"/>
+              <a:t>Jobs</a:t>
+            </a:r>
+            <a:endParaRPr lang="en-US" dirty="0"/>
+          </a:p>
+        </p:txBody>
+      </p:sp>
+      <p:sp>
+        <p:nvSpPr>
+          <p:cNvPr id="12" name="Rounded Rectangle 11"/>
+          <p:cNvSpPr/>
+          <p:nvPr/>
+        </p:nvSpPr>
+        <p:spPr>
+          <a:xfrm rot="16200000">
+            <a:off x="2185914" y="3199339"/>
+            <a:ext cx="1676398" cy="391572"/>
+          </a:xfrm>
+          <a:prstGeom prst="roundRect">
+            <a:avLst/>
+          </a:prstGeom>
+        </p:spPr>
+        <p:style>
+          <a:lnRef idx="2">
+            <a:schemeClr val="accent1">
+              <a:shade val="50000"/>
+            </a:schemeClr>
+          </a:lnRef>
+          <a:fillRef idx="1">
+            <a:schemeClr val="accent1"/>
+          </a:fillRef>
+          <a:effectRef idx="0">
+            <a:schemeClr val="accent1"/>
+          </a:effectRef>
+          <a:fontRef idx="minor">
+            <a:schemeClr val="lt1"/>
+          </a:fontRef>
+        </p:style>
+        <p:txBody>
+          <a:bodyPr rtlCol="0" anchor="ctr"/>
+          <a:lstStyle/>
+          <a:p>
+            <a:pPr algn="ctr"/>
+            <a:r>
+              <a:rPr lang="en-US" dirty="0" smtClean="0"/>
+              <a:t>PV</a:t>
+            </a:r>
+            <a:endParaRPr lang="en-US" dirty="0"/>
+          </a:p>
+        </p:txBody>
+      </p:sp>
+      <p:sp>
+        <p:nvSpPr>
+          <p:cNvPr id="13" name="Rounded Rectangle 12"/>
+          <p:cNvSpPr/>
+          <p:nvPr/>
+        </p:nvSpPr>
+        <p:spPr>
+          <a:xfrm rot="16200000">
+            <a:off x="2571731" y="3199338"/>
+            <a:ext cx="1676397" cy="391572"/>
+          </a:xfrm>
+          <a:prstGeom prst="roundRect">
+            <a:avLst/>
+          </a:prstGeom>
+        </p:spPr>
+        <p:style>
+          <a:lnRef idx="2">
+            <a:schemeClr val="accent1">
+              <a:shade val="50000"/>
+            </a:schemeClr>
+          </a:lnRef>
+          <a:fillRef idx="1">
+            <a:schemeClr val="accent1"/>
+          </a:fillRef>
+          <a:effectRef idx="0">
+            <a:schemeClr val="accent1"/>
+          </a:effectRef>
+          <a:fontRef idx="minor">
+            <a:schemeClr val="lt1"/>
+          </a:fontRef>
+        </p:style>
+        <p:txBody>
+          <a:bodyPr rtlCol="0" anchor="ctr"/>
+          <a:lstStyle/>
+          <a:p>
+            <a:pPr algn="ctr"/>
+            <a:r>
+              <a:rPr lang="en-US" dirty="0" smtClean="0"/>
+              <a:t>Archive</a:t>
+            </a:r>
+            <a:endParaRPr lang="en-US" dirty="0"/>
+          </a:p>
+        </p:txBody>
+      </p:sp>
+      <p:sp>
+        <p:nvSpPr>
+          <p:cNvPr id="14" name="Rounded Rectangle 13"/>
+          <p:cNvSpPr/>
+          <p:nvPr/>
+        </p:nvSpPr>
+        <p:spPr>
+          <a:xfrm>
+            <a:off x="2830897" y="4242290"/>
+            <a:ext cx="766491" cy="357242"/>
+          </a:xfrm>
+          <a:prstGeom prst="roundRect">
+            <a:avLst/>
+          </a:prstGeom>
+        </p:spPr>
+        <p:style>
+          <a:lnRef idx="2">
+            <a:schemeClr val="accent1">
+              <a:shade val="50000"/>
+            </a:schemeClr>
+          </a:lnRef>
+          <a:fillRef idx="1">
+            <a:schemeClr val="accent1"/>
+          </a:fillRef>
+          <a:effectRef idx="0">
+            <a:schemeClr val="accent1"/>
+          </a:effectRef>
+          <a:fontRef idx="minor">
+            <a:schemeClr val="lt1"/>
+          </a:fontRef>
+        </p:style>
+        <p:txBody>
+          <a:bodyPr rtlCol="0" anchor="ctr"/>
+          <a:lstStyle/>
+          <a:p>
+            <a:pPr algn="ctr"/>
+            <a:r>
+              <a:rPr lang="en-US" dirty="0" smtClean="0"/>
+              <a:t>Value</a:t>
+            </a:r>
+            <a:endParaRPr lang="en-US" dirty="0"/>
+          </a:p>
+        </p:txBody>
+      </p:sp>
+      <p:sp>
+        <p:nvSpPr>
+          <p:cNvPr id="15" name="Rounded Rectangle 14"/>
+          <p:cNvSpPr/>
+          <p:nvPr/>
+        </p:nvSpPr>
+        <p:spPr>
+          <a:xfrm rot="16200000">
+            <a:off x="2776531" y="3395128"/>
+            <a:ext cx="2051571" cy="375177"/>
+          </a:xfrm>
+          <a:prstGeom prst="roundRect">
+            <a:avLst/>
+          </a:prstGeom>
+        </p:spPr>
+        <p:style>
+          <a:lnRef idx="1">
+            <a:schemeClr val="accent1"/>
+          </a:lnRef>
+          <a:fillRef idx="2">
+            <a:schemeClr val="accent1"/>
+          </a:fillRef>
+          <a:effectRef idx="1">
+            <a:schemeClr val="accent1"/>
+          </a:effectRef>
+          <a:fontRef idx="minor">
+            <a:schemeClr val="dk1"/>
+          </a:fontRef>
+        </p:style>
+        <p:txBody>
+          <a:bodyPr rtlCol="0" anchor="ctr"/>
+          <a:lstStyle/>
+          <a:p>
+            <a:pPr algn="ctr"/>
+            <a:r>
+              <a:rPr lang="en-US" dirty="0" smtClean="0"/>
+              <a:t>Docking</a:t>
+            </a:r>
+            <a:endParaRPr lang="en-US" dirty="0"/>
+          </a:p>
+        </p:txBody>
+      </p:sp>
+      <p:sp>
+        <p:nvSpPr>
+          <p:cNvPr id="16" name="Rounded Rectangle 15"/>
+          <p:cNvSpPr/>
+          <p:nvPr/>
+        </p:nvSpPr>
+        <p:spPr>
+          <a:xfrm rot="16200000">
+            <a:off x="3161268" y="3386156"/>
+            <a:ext cx="2051571" cy="375177"/>
+          </a:xfrm>
+          <a:prstGeom prst="roundRect">
+            <a:avLst/>
+          </a:prstGeom>
+        </p:spPr>
+        <p:style>
+          <a:lnRef idx="1">
+            <a:schemeClr val="accent1"/>
+          </a:lnRef>
+          <a:fillRef idx="2">
+            <a:schemeClr val="accent1"/>
+          </a:fillRef>
+          <a:effectRef idx="1">
+            <a:schemeClr val="accent1"/>
+          </a:effectRef>
+          <a:fontRef idx="minor">
+            <a:schemeClr val="dk1"/>
+          </a:fontRef>
+        </p:style>
+        <p:txBody>
+          <a:bodyPr rtlCol="0" anchor="ctr"/>
+          <a:lstStyle/>
+          <a:p>
+            <a:pPr algn="ctr"/>
+            <a:r>
+              <a:rPr lang="en-US" dirty="0" smtClean="0"/>
+              <a:t>Selection</a:t>
+            </a:r>
+            <a:endParaRPr lang="en-US" dirty="0"/>
+          </a:p>
+        </p:txBody>
+      </p:sp>
+      <p:sp>
+        <p:nvSpPr>
+          <p:cNvPr id="17" name="Rounded Rectangle 16"/>
+          <p:cNvSpPr/>
+          <p:nvPr/>
+        </p:nvSpPr>
+        <p:spPr>
+          <a:xfrm rot="16200000">
+            <a:off x="3534861" y="3386154"/>
+            <a:ext cx="2051571" cy="375177"/>
+          </a:xfrm>
+          <a:prstGeom prst="roundRect">
+            <a:avLst/>
+          </a:prstGeom>
+        </p:spPr>
+        <p:style>
+          <a:lnRef idx="1">
+            <a:schemeClr val="accent1"/>
+          </a:lnRef>
+          <a:fillRef idx="2">
+            <a:schemeClr val="accent1"/>
+          </a:fillRef>
+          <a:effectRef idx="1">
+            <a:schemeClr val="accent1"/>
+          </a:effectRef>
+          <a:fontRef idx="minor">
+            <a:schemeClr val="dk1"/>
+          </a:fontRef>
+        </p:style>
+        <p:txBody>
+          <a:bodyPr rtlCol="0" anchor="ctr"/>
+          <a:lstStyle/>
+          <a:p>
+            <a:pPr algn="ctr"/>
+            <a:r>
+              <a:rPr lang="en-US" dirty="0" smtClean="0"/>
+              <a:t>Toolbar</a:t>
+            </a:r>
+            <a:endParaRPr lang="en-US" dirty="0"/>
+          </a:p>
+        </p:txBody>
+      </p:sp>
+      <p:sp>
+        <p:nvSpPr>
+          <p:cNvPr id="18" name="Rounded Rectangle 17"/>
+          <p:cNvSpPr/>
+          <p:nvPr/>
+        </p:nvSpPr>
+        <p:spPr>
+          <a:xfrm rot="16200000">
+            <a:off x="3917642" y="3386153"/>
+            <a:ext cx="2051571" cy="375177"/>
+          </a:xfrm>
+          <a:prstGeom prst="roundRect">
+            <a:avLst/>
+          </a:prstGeom>
+        </p:spPr>
+        <p:style>
+          <a:lnRef idx="1">
+            <a:schemeClr val="accent1"/>
+          </a:lnRef>
+          <a:fillRef idx="2">
+            <a:schemeClr val="accent1"/>
+          </a:fillRef>
+          <a:effectRef idx="1">
+            <a:schemeClr val="accent1"/>
+          </a:effectRef>
+          <a:fontRef idx="minor">
+            <a:schemeClr val="dk1"/>
+          </a:fontRef>
+        </p:style>
+        <p:txBody>
+          <a:bodyPr rtlCol="0" anchor="ctr"/>
+          <a:lstStyle/>
+          <a:p>
+            <a:pPr algn="ctr"/>
+            <a:r>
+              <a:rPr lang="en-US" dirty="0" smtClean="0"/>
+              <a:t>Menu</a:t>
+            </a:r>
+            <a:endParaRPr lang="en-US" dirty="0"/>
+          </a:p>
+        </p:txBody>
+      </p:sp>
+      <p:sp>
+        <p:nvSpPr>
+          <p:cNvPr id="19" name="Rounded Rectangle 18"/>
+          <p:cNvSpPr/>
+          <p:nvPr/>
+        </p:nvSpPr>
+        <p:spPr>
+          <a:xfrm rot="16200000">
+            <a:off x="5033460" y="3400922"/>
+            <a:ext cx="2051571" cy="375177"/>
+          </a:xfrm>
+          <a:prstGeom prst="roundRect">
+            <a:avLst/>
+          </a:prstGeom>
+        </p:spPr>
+        <p:style>
+          <a:lnRef idx="1">
+            <a:schemeClr val="accent1"/>
+          </a:lnRef>
+          <a:fillRef idx="2">
+            <a:schemeClr val="accent1"/>
+          </a:fillRef>
+          <a:effectRef idx="1">
+            <a:schemeClr val="accent1"/>
+          </a:effectRef>
+          <a:fontRef idx="minor">
+            <a:schemeClr val="dk1"/>
+          </a:fontRef>
+        </p:style>
+        <p:txBody>
+          <a:bodyPr rtlCol="0" anchor="ctr"/>
+          <a:lstStyle/>
+          <a:p>
+            <a:pPr algn="ctr"/>
+            <a:r>
+              <a:rPr lang="en-US" dirty="0" smtClean="0"/>
+              <a:t>Job Viewer</a:t>
+            </a:r>
+            <a:endParaRPr lang="en-US" dirty="0"/>
+          </a:p>
+        </p:txBody>
+      </p:sp>
+      <p:sp>
+        <p:nvSpPr>
+          <p:cNvPr id="20" name="Rounded Rectangle 19"/>
+          <p:cNvSpPr/>
+          <p:nvPr/>
+        </p:nvSpPr>
+        <p:spPr>
+          <a:xfrm rot="16200000">
+            <a:off x="5413051" y="3395122"/>
+            <a:ext cx="2051571" cy="375177"/>
+          </a:xfrm>
+          <a:prstGeom prst="roundRect">
+            <a:avLst/>
+          </a:prstGeom>
+        </p:spPr>
+        <p:style>
+          <a:lnRef idx="1">
+            <a:schemeClr val="accent1"/>
+          </a:lnRef>
+          <a:fillRef idx="2">
+            <a:schemeClr val="accent1"/>
+          </a:fillRef>
+          <a:effectRef idx="1">
+            <a:schemeClr val="accent1"/>
+          </a:effectRef>
+          <a:fontRef idx="minor">
+            <a:schemeClr val="dk1"/>
+          </a:fontRef>
+        </p:style>
+        <p:txBody>
+          <a:bodyPr rtlCol="0" anchor="ctr"/>
+          <a:lstStyle/>
+          <a:p>
+            <a:pPr algn="ctr"/>
+            <a:r>
+              <a:rPr lang="en-US" dirty="0" smtClean="0"/>
+              <a:t>PV List</a:t>
+            </a:r>
+            <a:endParaRPr lang="en-US" dirty="0"/>
+          </a:p>
+        </p:txBody>
+      </p:sp>
+      <p:sp>
+        <p:nvSpPr>
+          <p:cNvPr id="21" name="Rounded Rectangle 20"/>
+          <p:cNvSpPr/>
+          <p:nvPr/>
+        </p:nvSpPr>
+        <p:spPr>
+          <a:xfrm rot="16200000">
+            <a:off x="4294095" y="3386153"/>
+            <a:ext cx="2051571" cy="375177"/>
+          </a:xfrm>
+          <a:prstGeom prst="roundRect">
+            <a:avLst/>
+          </a:prstGeom>
+        </p:spPr>
+        <p:style>
+          <a:lnRef idx="1">
+            <a:schemeClr val="accent1"/>
+          </a:lnRef>
+          <a:fillRef idx="2">
+            <a:schemeClr val="accent1"/>
+          </a:fillRef>
+          <a:effectRef idx="1">
+            <a:schemeClr val="accent1"/>
+          </a:effectRef>
+          <a:fontRef idx="minor">
+            <a:schemeClr val="dk1"/>
+          </a:fontRef>
+        </p:style>
+        <p:txBody>
+          <a:bodyPr rtlCol="0" anchor="ctr"/>
+          <a:lstStyle/>
+          <a:p>
+            <a:pPr algn="ctr"/>
+            <a:r>
+              <a:rPr lang="en-US" dirty="0" smtClean="0"/>
+              <a:t>Context  Menu</a:t>
+            </a:r>
+            <a:endParaRPr lang="en-US" dirty="0"/>
+          </a:p>
+        </p:txBody>
+      </p:sp>
+      <p:sp>
+        <p:nvSpPr>
+          <p:cNvPr id="24" name="Rounded Rectangle 23"/>
+          <p:cNvSpPr/>
+          <p:nvPr/>
+        </p:nvSpPr>
+        <p:spPr>
+          <a:xfrm>
+            <a:off x="3591393" y="4608491"/>
+            <a:ext cx="3026531" cy="375177"/>
+          </a:xfrm>
+          <a:prstGeom prst="roundRect">
+            <a:avLst/>
+          </a:prstGeom>
+        </p:spPr>
+        <p:style>
+          <a:lnRef idx="1">
+            <a:schemeClr val="accent1"/>
+          </a:lnRef>
+          <a:fillRef idx="2">
+            <a:schemeClr val="accent1"/>
+          </a:fillRef>
+          <a:effectRef idx="1">
+            <a:schemeClr val="accent1"/>
+          </a:effectRef>
+          <a:fontRef idx="minor">
+            <a:schemeClr val="dk1"/>
+          </a:fontRef>
+        </p:style>
+        <p:txBody>
+          <a:bodyPr rtlCol="0" anchor="ctr"/>
+          <a:lstStyle/>
+          <a:p>
+            <a:pPr algn="ctr"/>
+            <a:r>
+              <a:rPr lang="en-US" dirty="0" smtClean="0"/>
+              <a:t>J</a:t>
+            </a:r>
+            <a:r>
+              <a:rPr lang="en-US" dirty="0" smtClean="0"/>
+              <a:t>avaFX</a:t>
             </a:r>
             <a:endParaRPr lang="en-US" dirty="0"/>
           </a:p>
@@ -3854,7 +3871,7 @@
             <a:pPr algn="ctr"/>
             <a:r>
               <a:rPr lang="en-US" dirty="0" smtClean="0"/>
-              <a:t>probe</a:t>
+              <a:t>Probe</a:t>
             </a:r>
             <a:endParaRPr lang="en-US" dirty="0"/>
           </a:p>
@@ -3868,8 +3885,8 @@
         </p:nvSpPr>
         <p:spPr>
           <a:xfrm rot="16200000">
-            <a:off x="4850621" y="3207535"/>
-            <a:ext cx="1676395" cy="375177"/>
+            <a:off x="4663033" y="3395122"/>
+            <a:ext cx="2051571" cy="375177"/>
           </a:xfrm>
           <a:prstGeom prst="roundRect">
             <a:avLst/>
@@ -3895,12 +3912,12 @@
           <a:p>
             <a:pPr algn="ctr"/>
             <a:r>
-              <a:rPr lang="en-US" dirty="0"/>
-              <a:t>l</a:t>
-            </a:r>
-            <a:r>
               <a:rPr lang="en-US" dirty="0" smtClean="0"/>
-              <a:t>og config</a:t>
+              <a:t>Log </a:t>
+            </a:r>
+            <a:r>
+              <a:rPr lang="en-US" smtClean="0"/>
+              <a:t>Config</a:t>
             </a:r>
             <a:endParaRPr lang="en-US" dirty="0"/>
           </a:p>
@@ -3944,7 +3961,7 @@
             <a:pPr algn="ctr"/>
             <a:r>
               <a:rPr lang="en-US" dirty="0" smtClean="0"/>
-              <a:t>application</a:t>
+              <a:t>Application</a:t>
             </a:r>
             <a:endParaRPr lang="en-US" dirty="0"/>
           </a:p>
@@ -3986,7 +4003,7 @@
             <a:pPr algn="ctr"/>
             <a:r>
               <a:rPr lang="en-US" dirty="0" smtClean="0"/>
-              <a:t>pv tree</a:t>
+              <a:t>PV Tree</a:t>
             </a:r>
             <a:endParaRPr lang="en-US" dirty="0"/>
           </a:p>
@@ -4028,7 +4045,7 @@
             <a:pPr algn="ctr"/>
             <a:r>
               <a:rPr lang="en-US" dirty="0" smtClean="0"/>
-              <a:t>pv table</a:t>
+              <a:t>PV Table</a:t>
             </a:r>
             <a:endParaRPr lang="en-US" dirty="0"/>
           </a:p>
@@ -4069,8 +4086,20 @@
           <a:p>
             <a:pPr algn="ctr"/>
             <a:r>
+              <a:rPr lang="en-US" dirty="0"/>
+              <a:t>D</a:t>
+            </a:r>
+            <a:r>
               <a:rPr lang="en-US" dirty="0" smtClean="0"/>
-              <a:t>display builder</a:t>
+              <a:t>isplay </a:t>
+            </a:r>
+            <a:r>
+              <a:rPr lang="en-US" dirty="0"/>
+              <a:t>B</a:t>
+            </a:r>
+            <a:r>
+              <a:rPr lang="en-US" dirty="0" smtClean="0"/>
+              <a:t>uilder</a:t>
             </a:r>
             <a:endParaRPr lang="en-US" dirty="0"/>
           </a:p>
@@ -4112,7 +4141,7 @@
             <a:pPr algn="ctr"/>
             <a:r>
               <a:rPr lang="en-US" dirty="0" smtClean="0"/>
-              <a:t>data browser</a:t>
+              <a:t>Data Browser</a:t>
             </a:r>
             <a:endParaRPr lang="en-US" dirty="0"/>
           </a:p>
@@ -4154,7 +4183,7 @@
             <a:pPr algn="ctr"/>
             <a:r>
               <a:rPr lang="en-US" dirty="0" smtClean="0"/>
-              <a:t>alarm display</a:t>
+              <a:t>Alarm Display</a:t>
             </a:r>
             <a:endParaRPr lang="en-US" dirty="0"/>
           </a:p>
@@ -4196,7 +4225,7 @@
             <a:pPr algn="ctr"/>
             <a:r>
               <a:rPr lang="en-US" dirty="0" smtClean="0"/>
-              <a:t>scan monitor</a:t>
+              <a:t>Scan Monitor</a:t>
             </a:r>
             <a:endParaRPr lang="en-US" dirty="0"/>
           </a:p>

</xml_diff>